<commit_message>
Powerpoint and pdf mod.
</commit_message>
<xml_diff>
--- a/20240524/Ansibleについて知ろう.pptx
+++ b/20240524/Ansibleについて知ろう.pptx
@@ -1230,7 +1230,7 @@
           <a:p>
             <a:fld id="{B5C59BA4-7C1B-4DE2-B397-F366871A932A}" type="datetimeFigureOut">
               <a:rPr kumimoji="1" lang="ja-JP" altLang="en-US" smtClean="0"/>
-              <a:t>2024/5/18</a:t>
+              <a:t>2024/5/21</a:t>
             </a:fld>
             <a:endParaRPr kumimoji="1" lang="ja-JP" altLang="en-US"/>
           </a:p>
@@ -4846,18 +4846,24 @@
           <a:p>
             <a:r>
               <a:rPr kumimoji="1" lang="ja-JP" altLang="en-US" sz="2400" dirty="0"/>
+              <a:t>モジュールにどのような引数を与えるかで処理を決定する箇所</a:t>
+            </a:r>
+            <a:endParaRPr kumimoji="1" lang="en-US" altLang="ja-JP" sz="2400" dirty="0"/>
+          </a:p>
+          <a:p>
+            <a:endParaRPr kumimoji="1" lang="en-US" altLang="ja-JP" sz="2400" dirty="0"/>
+          </a:p>
+          <a:p>
+            <a:r>
+              <a:rPr kumimoji="1" lang="ja-JP" altLang="en-US" sz="2400" dirty="0"/>
               <a:t>固有の「タスク名」を設定する</a:t>
             </a:r>
             <a:endParaRPr kumimoji="1" lang="en-US" altLang="ja-JP" sz="2400" dirty="0"/>
           </a:p>
           <a:p>
-            <a:endParaRPr kumimoji="1" lang="en-US" altLang="ja-JP" sz="2400" dirty="0"/>
-          </a:p>
-          <a:p>
-            <a:r>
-              <a:rPr kumimoji="1" lang="ja-JP" altLang="en-US" sz="2400" dirty="0"/>
-              <a:t>タスクを組み合わせて処理を作成する</a:t>
-            </a:r>
+            <a:pPr marL="0" indent="0">
+              <a:buNone/>
+            </a:pPr>
             <a:endParaRPr kumimoji="1" lang="en-US" altLang="ja-JP" sz="2400" dirty="0"/>
           </a:p>
           <a:p>
@@ -5088,8 +5094,8 @@
         </p:nvSpPr>
         <p:spPr>
           <a:xfrm>
-            <a:off x="222885" y="1015683"/>
-            <a:ext cx="11826875" cy="1487372"/>
+            <a:off x="222885" y="1015682"/>
+            <a:ext cx="11826875" cy="1649615"/>
           </a:xfrm>
         </p:spPr>
         <p:txBody>
@@ -5098,7 +5104,7 @@
           <a:p>
             <a:r>
               <a:rPr kumimoji="1" lang="ja-JP" altLang="en-US" sz="2400" dirty="0"/>
-              <a:t>タスクを処理の順番に並べ、対象の管理対象ノード、変数などを追加したもの</a:t>
+              <a:t>タスクを処理の順番に並べ、対象の管理対象ノード、変数などを設定した処理のひとかたまりで、上から処理を実行する</a:t>
             </a:r>
             <a:endParaRPr kumimoji="1" lang="en-US" altLang="ja-JP" sz="2400" dirty="0"/>
           </a:p>
@@ -5138,8 +5144,8 @@
         </p:nvSpPr>
         <p:spPr>
           <a:xfrm>
-            <a:off x="4133272" y="2589713"/>
-            <a:ext cx="3925455" cy="4126681"/>
+            <a:off x="4133268" y="2669127"/>
+            <a:ext cx="3925455" cy="3732429"/>
           </a:xfrm>
           <a:prstGeom prst="rect">
             <a:avLst/>
@@ -8575,9 +8581,16 @@
 <file path=customXml/itemProps2.xml><?xml version="1.0" encoding="utf-8"?>
 <ds:datastoreItem xmlns:ds="http://schemas.openxmlformats.org/officeDocument/2006/customXml" ds:itemID="{AFD2C487-7431-40FA-A912-1148C9736568}">
   <ds:schemaRefs>
+    <ds:schemaRef ds:uri="http://schemas.microsoft.com/office/2006/documentManagement/types"/>
+    <ds:schemaRef ds:uri="http://schemas.openxmlformats.org/package/2006/metadata/core-properties"/>
+    <ds:schemaRef ds:uri="http://purl.org/dc/dcmitype/"/>
+    <ds:schemaRef ds:uri="http://purl.org/dc/terms/"/>
+    <ds:schemaRef ds:uri="http://purl.org/dc/elements/1.1/"/>
     <ds:schemaRef ds:uri="http://schemas.microsoft.com/office/2006/metadata/properties"/>
+    <ds:schemaRef ds:uri="275fa786-70a4-42a6-bf18-fe8d89b802cf"/>
     <ds:schemaRef ds:uri="http://schemas.microsoft.com/office/infopath/2007/PartnerControls"/>
     <ds:schemaRef ds:uri="dda6833c-0046-4f8f-9c83-6e1ad4a6ae00"/>
+    <ds:schemaRef ds:uri="http://www.w3.org/XML/1998/namespace"/>
   </ds:schemaRefs>
 </ds:datastoreItem>
 </file>

</xml_diff>